<commit_message>
Teamwork assignment and OOP HW 2
</commit_message>
<xml_diff>
--- a/3. Обектно-ориентирано програмиране (ООП)/Lections/2.Defining-Classes-Part-II-Static-Members-Generics.pptx
+++ b/3. Обектно-ориентирано програмиране (ООП)/Lections/2.Defining-Classes-Part-II-Static-Members-Generics.pptx
@@ -205,7 +205,7 @@
   </p:defaultTextStyle>
   <p:extLst>
     <p:ext uri="{EFAFB233-063F-42B5-8137-9DF3F51BA10A}">
-      <p15:sldGuideLst xmlns:p15="http://schemas.microsoft.com/office/powerpoint/2012/main">
+      <p15:sldGuideLst xmlns:p15="http://schemas.microsoft.com/office/powerpoint/2012/main" xmlns="">
         <p15:guide id="1" orient="horz" pos="2160">
           <p15:clr>
             <a:srgbClr val="A4A3A4"/>
@@ -219,7 +219,7 @@
       </p15:sldGuideLst>
     </p:ext>
     <p:ext uri="{2D200454-40CA-4A62-9FC3-DE9A4176ACB9}">
-      <p15:notesGuideLst xmlns:p15="http://schemas.microsoft.com/office/powerpoint/2012/main">
+      <p15:notesGuideLst xmlns:p15="http://schemas.microsoft.com/office/powerpoint/2012/main" xmlns="">
         <p15:guide id="1" orient="horz" pos="2928">
           <p15:clr>
             <a:srgbClr val="A4A3A4"/>
@@ -351,7 +351,7 @@
             <a:fld id="{3BF7C7B5-275F-4D1F-9AB4-9255447DBC73}" type="datetimeFigureOut">
               <a:rPr lang="en-US"/>
               <a:pPr/>
-              <a:t>06.03.2013</a:t>
+              <a:t>2/3/2014</a:t>
             </a:fld>
             <a:endParaRPr lang="en-US" dirty="0"/>
           </a:p>
@@ -582,7 +582,7 @@
             <a:fld id="{9B46F231-FB2B-4655-A644-E2477325E686}" type="datetimeFigureOut">
               <a:rPr lang="en-US"/>
               <a:pPr/>
-              <a:t>06.03.2013</a:t>
+              <a:t>2/3/2014</a:t>
             </a:fld>
             <a:endParaRPr lang="en-US" dirty="0"/>
           </a:p>
@@ -9859,7 +9859,7 @@
         </p:blipFill>
         <p:spPr bwMode="auto">
           <a:xfrm>
-            <a:off x="3505200" y="4718008"/>
+            <a:off x="7543800" y="4267200"/>
             <a:ext cx="1476780" cy="1611030"/>
           </a:xfrm>
           <a:prstGeom prst="rect">
@@ -9900,1351 +9900,6 @@
           </a:extLst>
         </p:spPr>
       </p:pic>
-      <p:sp>
-        <p:nvSpPr>
-          <p:cNvPr id="34" name="Text Placeholder 4"/>
-          <p:cNvSpPr>
-            <a:spLocks noGrp="1"/>
-          </p:cNvSpPr>
-          <p:nvPr/>
-        </p:nvSpPr>
-        <p:spPr>
-          <a:xfrm>
-            <a:off x="381000" y="4495800"/>
-            <a:ext cx="3046709" cy="533400"/>
-          </a:xfrm>
-          <a:prstGeom prst="rect">
-            <a:avLst/>
-          </a:prstGeom>
-          <a:noFill/>
-        </p:spPr>
-        <p:txBody>
-          <a:bodyPr wrap="square" rtlCol="0">
-            <a:spAutoFit/>
-          </a:bodyPr>
-          <a:lstStyle>
-            <a:lvl1pPr marL="319088" indent="-319088" algn="l" rtl="0" eaLnBrk="0" fontAlgn="base" hangingPunct="0">
-              <a:spcBef>
-                <a:spcPct val="0"/>
-              </a:spcBef>
-              <a:spcAft>
-                <a:spcPct val="0"/>
-              </a:spcAft>
-              <a:buClr>
-                <a:schemeClr val="accent5">
-                  <a:lumMod val="40000"/>
-                  <a:lumOff val="60000"/>
-                </a:schemeClr>
-              </a:buClr>
-              <a:buSzPct val="70000"/>
-              <a:buFont typeface="Wingdings 2" pitchFamily="18" charset="2"/>
-              <a:buNone/>
-              <a:defRPr lang="en-US" sz="2800" b="1" kern="1200" dirty="0" smtClean="0">
-                <a:solidFill>
-                  <a:srgbClr val="DEFF9B"/>
-                </a:solidFill>
-                <a:effectLst>
-                  <a:outerShdw blurRad="38100" dist="38100" dir="2700000" algn="tl">
-                    <a:srgbClr val="000000">
-                      <a:alpha val="43137"/>
-                    </a:srgbClr>
-                  </a:outerShdw>
-                </a:effectLst>
-                <a:latin typeface="Corbel" pitchFamily="34" charset="0"/>
-                <a:ea typeface="+mn-ea"/>
-                <a:cs typeface="+mn-cs"/>
-              </a:defRPr>
-            </a:lvl1pPr>
-            <a:lvl2pPr marL="630238" indent="-273050" algn="l" rtl="0" eaLnBrk="0" fontAlgn="base" hangingPunct="0">
-              <a:spcBef>
-                <a:spcPct val="20000"/>
-              </a:spcBef>
-              <a:spcAft>
-                <a:spcPct val="0"/>
-              </a:spcAft>
-              <a:buClr>
-                <a:schemeClr val="accent2">
-                  <a:lumMod val="60000"/>
-                  <a:lumOff val="40000"/>
-                </a:schemeClr>
-              </a:buClr>
-              <a:buFont typeface="Wingdings 2" pitchFamily="18" charset="2"/>
-              <a:buChar char=""/>
-              <a:defRPr sz="3000" b="1" kern="1200">
-                <a:solidFill>
-                  <a:schemeClr val="tx1">
-                    <a:lumMod val="20000"/>
-                    <a:lumOff val="80000"/>
-                  </a:schemeClr>
-                </a:solidFill>
-                <a:effectLst>
-                  <a:outerShdw blurRad="38100" dist="38100" dir="2700000" algn="tl">
-                    <a:srgbClr val="000000">
-                      <a:alpha val="43137"/>
-                    </a:srgbClr>
-                  </a:outerShdw>
-                </a:effectLst>
-                <a:latin typeface="+mn-lt"/>
-                <a:ea typeface="+mn-ea"/>
-                <a:cs typeface="+mn-cs"/>
-              </a:defRPr>
-            </a:lvl2pPr>
-            <a:lvl3pPr marL="922338" indent="-273050" algn="l" rtl="0" eaLnBrk="0" fontAlgn="base" hangingPunct="0">
-              <a:spcBef>
-                <a:spcPct val="20000"/>
-              </a:spcBef>
-              <a:spcAft>
-                <a:spcPct val="0"/>
-              </a:spcAft>
-              <a:buClr>
-                <a:schemeClr val="tx1">
-                  <a:lumMod val="50000"/>
-                </a:schemeClr>
-              </a:buClr>
-              <a:buFont typeface="Wingdings 2" pitchFamily="18" charset="2"/>
-              <a:buChar char=""/>
-              <a:defRPr sz="2800" b="1" kern="1200">
-                <a:solidFill>
-                  <a:schemeClr val="tx1">
-                    <a:lumMod val="20000"/>
-                    <a:lumOff val="80000"/>
-                  </a:schemeClr>
-                </a:solidFill>
-                <a:effectLst>
-                  <a:outerShdw blurRad="38100" dist="38100" dir="2700000" algn="tl">
-                    <a:srgbClr val="000000">
-                      <a:alpha val="43137"/>
-                    </a:srgbClr>
-                  </a:outerShdw>
-                </a:effectLst>
-                <a:latin typeface="+mn-lt"/>
-                <a:ea typeface="+mn-ea"/>
-                <a:cs typeface="+mn-cs"/>
-              </a:defRPr>
-            </a:lvl3pPr>
-            <a:lvl4pPr marL="1187450" indent="-228600" algn="l" rtl="0" eaLnBrk="0" fontAlgn="base" hangingPunct="0">
-              <a:spcBef>
-                <a:spcPct val="20000"/>
-              </a:spcBef>
-              <a:spcAft>
-                <a:spcPct val="0"/>
-              </a:spcAft>
-              <a:buClr>
-                <a:srgbClr val="F8BD52"/>
-              </a:buClr>
-              <a:buFont typeface="Wingdings 2" pitchFamily="18" charset="2"/>
-              <a:buChar char=""/>
-              <a:defRPr sz="2600" b="1" kern="1200">
-                <a:solidFill>
-                  <a:schemeClr val="tx1">
-                    <a:lumMod val="20000"/>
-                    <a:lumOff val="80000"/>
-                  </a:schemeClr>
-                </a:solidFill>
-                <a:effectLst>
-                  <a:outerShdw blurRad="38100" dist="38100" dir="2700000" algn="tl">
-                    <a:srgbClr val="000000">
-                      <a:alpha val="43137"/>
-                    </a:srgbClr>
-                  </a:outerShdw>
-                </a:effectLst>
-                <a:latin typeface="+mn-lt"/>
-                <a:ea typeface="+mn-ea"/>
-                <a:cs typeface="+mn-cs"/>
-              </a:defRPr>
-            </a:lvl4pPr>
-            <a:lvl5pPr marL="1425575" indent="-228600" algn="l" rtl="0" eaLnBrk="0" fontAlgn="base" hangingPunct="0">
-              <a:spcBef>
-                <a:spcPct val="20000"/>
-              </a:spcBef>
-              <a:spcAft>
-                <a:spcPct val="0"/>
-              </a:spcAft>
-              <a:buClr>
-                <a:srgbClr val="46A6BD"/>
-              </a:buClr>
-              <a:buFont typeface="Wingdings 2" pitchFamily="18" charset="2"/>
-              <a:buChar char=""/>
-              <a:defRPr sz="2400" b="1" kern="1200">
-                <a:solidFill>
-                  <a:schemeClr val="tx1">
-                    <a:lumMod val="20000"/>
-                    <a:lumOff val="80000"/>
-                  </a:schemeClr>
-                </a:solidFill>
-                <a:effectLst>
-                  <a:outerShdw blurRad="38100" dist="38100" dir="2700000" algn="tl">
-                    <a:srgbClr val="000000">
-                      <a:alpha val="43137"/>
-                    </a:srgbClr>
-                  </a:outerShdw>
-                </a:effectLst>
-                <a:latin typeface="+mn-lt"/>
-                <a:ea typeface="+mn-ea"/>
-                <a:cs typeface="+mn-cs"/>
-              </a:defRPr>
-            </a:lvl5pPr>
-            <a:lvl6pPr marL="1673352" indent="-228600" algn="l" rtl="0" eaLnBrk="1" latinLnBrk="0" hangingPunct="1">
-              <a:spcBef>
-                <a:spcPct val="20000"/>
-              </a:spcBef>
-              <a:buClr>
-                <a:schemeClr val="accent6"/>
-              </a:buClr>
-              <a:buFont typeface="Wingdings 2"/>
-              <a:buChar char=""/>
-              <a:defRPr sz="1800" kern="1200">
-                <a:solidFill>
-                  <a:schemeClr val="tx1"/>
-                </a:solidFill>
-                <a:latin typeface="+mn-lt"/>
-                <a:ea typeface="+mn-ea"/>
-                <a:cs typeface="+mn-cs"/>
-              </a:defRPr>
-            </a:lvl6pPr>
-            <a:lvl7pPr marL="1911096" indent="-228600" algn="l" rtl="0" eaLnBrk="1" latinLnBrk="0" hangingPunct="1">
-              <a:spcBef>
-                <a:spcPct val="20000"/>
-              </a:spcBef>
-              <a:buClr>
-                <a:schemeClr val="tx2"/>
-              </a:buClr>
-              <a:buFont typeface="Wingdings 2"/>
-              <a:buChar char=""/>
-              <a:defRPr sz="1600" kern="1200">
-                <a:solidFill>
-                  <a:schemeClr val="tx1"/>
-                </a:solidFill>
-                <a:latin typeface="+mn-lt"/>
-                <a:ea typeface="+mn-ea"/>
-                <a:cs typeface="+mn-cs"/>
-              </a:defRPr>
-            </a:lvl7pPr>
-            <a:lvl8pPr marL="2121408" indent="-182880" algn="l" rtl="0" eaLnBrk="1" latinLnBrk="0" hangingPunct="1">
-              <a:spcBef>
-                <a:spcPct val="20000"/>
-              </a:spcBef>
-              <a:buClr>
-                <a:schemeClr val="tx2"/>
-              </a:buClr>
-              <a:buFont typeface="Wingdings 2"/>
-              <a:buChar char=""/>
-              <a:defRPr sz="1400" kern="1200">
-                <a:solidFill>
-                  <a:schemeClr val="tx1"/>
-                </a:solidFill>
-                <a:latin typeface="+mn-lt"/>
-                <a:ea typeface="+mn-ea"/>
-                <a:cs typeface="+mn-cs"/>
-              </a:defRPr>
-            </a:lvl8pPr>
-            <a:lvl9pPr marL="2322576" indent="-182880" algn="l" rtl="0" eaLnBrk="1" latinLnBrk="0" hangingPunct="1">
-              <a:spcBef>
-                <a:spcPct val="20000"/>
-              </a:spcBef>
-              <a:buClr>
-                <a:schemeClr val="tx2"/>
-              </a:buClr>
-              <a:buFont typeface="Wingdings 2"/>
-              <a:buChar char=""/>
-              <a:defRPr sz="1400" kern="1200">
-                <a:solidFill>
-                  <a:schemeClr val="tx1"/>
-                </a:solidFill>
-                <a:latin typeface="+mn-lt"/>
-                <a:ea typeface="+mn-ea"/>
-                <a:cs typeface="+mn-cs"/>
-              </a:defRPr>
-            </a:lvl9pPr>
-          </a:lstStyle>
-          <a:p>
-            <a:r>
-              <a:rPr lang="en-US" dirty="0" smtClean="0"/>
-              <a:t>Svetlin Nakov</a:t>
-            </a:r>
-            <a:endParaRPr lang="en-US" dirty="0"/>
-          </a:p>
-        </p:txBody>
-      </p:sp>
-      <p:sp>
-        <p:nvSpPr>
-          <p:cNvPr id="35" name="Text Placeholder 5"/>
-          <p:cNvSpPr>
-            <a:spLocks noGrp="1"/>
-          </p:cNvSpPr>
-          <p:nvPr/>
-        </p:nvSpPr>
-        <p:spPr>
-          <a:xfrm>
-            <a:off x="419101" y="5757446"/>
-            <a:ext cx="3012477" cy="369332"/>
-          </a:xfrm>
-          <a:prstGeom prst="rect">
-            <a:avLst/>
-          </a:prstGeom>
-          <a:noFill/>
-        </p:spPr>
-        <p:txBody>
-          <a:bodyPr wrap="square" rtlCol="0">
-            <a:spAutoFit/>
-          </a:bodyPr>
-          <a:lstStyle>
-            <a:lvl1pPr marL="0" indent="0" algn="l" rtl="0" eaLnBrk="0" fontAlgn="base" hangingPunct="0">
-              <a:spcBef>
-                <a:spcPct val="0"/>
-              </a:spcBef>
-              <a:spcAft>
-                <a:spcPct val="0"/>
-              </a:spcAft>
-              <a:buClr>
-                <a:schemeClr val="accent5">
-                  <a:lumMod val="40000"/>
-                  <a:lumOff val="60000"/>
-                </a:schemeClr>
-              </a:buClr>
-              <a:buSzPct val="70000"/>
-              <a:buFont typeface="Wingdings 2" pitchFamily="18" charset="2"/>
-              <a:buNone/>
-              <a:defRPr lang="en-US" sz="1800" b="1" kern="1200" dirty="0">
-                <a:solidFill>
-                  <a:schemeClr val="tx2">
-                    <a:lumMod val="20000"/>
-                    <a:lumOff val="80000"/>
-                  </a:schemeClr>
-                </a:solidFill>
-                <a:effectLst>
-                  <a:outerShdw blurRad="38100" dist="38100" dir="2700000" algn="tl">
-                    <a:srgbClr val="000000">
-                      <a:alpha val="43137"/>
-                    </a:srgbClr>
-                  </a:outerShdw>
-                </a:effectLst>
-                <a:latin typeface="Corbel" pitchFamily="34" charset="0"/>
-                <a:ea typeface="+mn-ea"/>
-                <a:cs typeface="+mn-cs"/>
-              </a:defRPr>
-            </a:lvl1pPr>
-            <a:lvl2pPr marL="630238" indent="-273050" algn="l" rtl="0" eaLnBrk="0" fontAlgn="base" hangingPunct="0">
-              <a:spcBef>
-                <a:spcPct val="20000"/>
-              </a:spcBef>
-              <a:spcAft>
-                <a:spcPct val="0"/>
-              </a:spcAft>
-              <a:buClr>
-                <a:schemeClr val="accent2">
-                  <a:lumMod val="60000"/>
-                  <a:lumOff val="40000"/>
-                </a:schemeClr>
-              </a:buClr>
-              <a:buFont typeface="Wingdings 2" pitchFamily="18" charset="2"/>
-              <a:buChar char=""/>
-              <a:defRPr sz="3000" b="1" kern="1200">
-                <a:solidFill>
-                  <a:schemeClr val="tx1">
-                    <a:lumMod val="20000"/>
-                    <a:lumOff val="80000"/>
-                  </a:schemeClr>
-                </a:solidFill>
-                <a:effectLst>
-                  <a:outerShdw blurRad="38100" dist="38100" dir="2700000" algn="tl">
-                    <a:srgbClr val="000000">
-                      <a:alpha val="43137"/>
-                    </a:srgbClr>
-                  </a:outerShdw>
-                </a:effectLst>
-                <a:latin typeface="+mn-lt"/>
-                <a:ea typeface="+mn-ea"/>
-                <a:cs typeface="+mn-cs"/>
-              </a:defRPr>
-            </a:lvl2pPr>
-            <a:lvl3pPr marL="922338" indent="-273050" algn="l" rtl="0" eaLnBrk="0" fontAlgn="base" hangingPunct="0">
-              <a:spcBef>
-                <a:spcPct val="20000"/>
-              </a:spcBef>
-              <a:spcAft>
-                <a:spcPct val="0"/>
-              </a:spcAft>
-              <a:buClr>
-                <a:schemeClr val="tx1">
-                  <a:lumMod val="50000"/>
-                </a:schemeClr>
-              </a:buClr>
-              <a:buFont typeface="Wingdings 2" pitchFamily="18" charset="2"/>
-              <a:buChar char=""/>
-              <a:defRPr sz="2800" b="1" kern="1200">
-                <a:solidFill>
-                  <a:schemeClr val="tx1">
-                    <a:lumMod val="20000"/>
-                    <a:lumOff val="80000"/>
-                  </a:schemeClr>
-                </a:solidFill>
-                <a:effectLst>
-                  <a:outerShdw blurRad="38100" dist="38100" dir="2700000" algn="tl">
-                    <a:srgbClr val="000000">
-                      <a:alpha val="43137"/>
-                    </a:srgbClr>
-                  </a:outerShdw>
-                </a:effectLst>
-                <a:latin typeface="+mn-lt"/>
-                <a:ea typeface="+mn-ea"/>
-                <a:cs typeface="+mn-cs"/>
-              </a:defRPr>
-            </a:lvl3pPr>
-            <a:lvl4pPr marL="1187450" indent="-228600" algn="l" rtl="0" eaLnBrk="0" fontAlgn="base" hangingPunct="0">
-              <a:spcBef>
-                <a:spcPct val="20000"/>
-              </a:spcBef>
-              <a:spcAft>
-                <a:spcPct val="0"/>
-              </a:spcAft>
-              <a:buClr>
-                <a:srgbClr val="F8BD52"/>
-              </a:buClr>
-              <a:buFont typeface="Wingdings 2" pitchFamily="18" charset="2"/>
-              <a:buChar char=""/>
-              <a:defRPr sz="2600" b="1" kern="1200">
-                <a:solidFill>
-                  <a:schemeClr val="tx1">
-                    <a:lumMod val="20000"/>
-                    <a:lumOff val="80000"/>
-                  </a:schemeClr>
-                </a:solidFill>
-                <a:effectLst>
-                  <a:outerShdw blurRad="38100" dist="38100" dir="2700000" algn="tl">
-                    <a:srgbClr val="000000">
-                      <a:alpha val="43137"/>
-                    </a:srgbClr>
-                  </a:outerShdw>
-                </a:effectLst>
-                <a:latin typeface="+mn-lt"/>
-                <a:ea typeface="+mn-ea"/>
-                <a:cs typeface="+mn-cs"/>
-              </a:defRPr>
-            </a:lvl4pPr>
-            <a:lvl5pPr marL="1425575" indent="-228600" algn="l" rtl="0" eaLnBrk="0" fontAlgn="base" hangingPunct="0">
-              <a:spcBef>
-                <a:spcPct val="20000"/>
-              </a:spcBef>
-              <a:spcAft>
-                <a:spcPct val="0"/>
-              </a:spcAft>
-              <a:buClr>
-                <a:srgbClr val="46A6BD"/>
-              </a:buClr>
-              <a:buFont typeface="Wingdings 2" pitchFamily="18" charset="2"/>
-              <a:buChar char=""/>
-              <a:defRPr sz="2400" b="1" kern="1200">
-                <a:solidFill>
-                  <a:schemeClr val="tx1">
-                    <a:lumMod val="20000"/>
-                    <a:lumOff val="80000"/>
-                  </a:schemeClr>
-                </a:solidFill>
-                <a:effectLst>
-                  <a:outerShdw blurRad="38100" dist="38100" dir="2700000" algn="tl">
-                    <a:srgbClr val="000000">
-                      <a:alpha val="43137"/>
-                    </a:srgbClr>
-                  </a:outerShdw>
-                </a:effectLst>
-                <a:latin typeface="+mn-lt"/>
-                <a:ea typeface="+mn-ea"/>
-                <a:cs typeface="+mn-cs"/>
-              </a:defRPr>
-            </a:lvl5pPr>
-            <a:lvl6pPr marL="1673352" indent="-228600" algn="l" rtl="0" eaLnBrk="1" latinLnBrk="0" hangingPunct="1">
-              <a:spcBef>
-                <a:spcPct val="20000"/>
-              </a:spcBef>
-              <a:buClr>
-                <a:schemeClr val="accent6"/>
-              </a:buClr>
-              <a:buFont typeface="Wingdings 2"/>
-              <a:buChar char=""/>
-              <a:defRPr sz="1800" kern="1200">
-                <a:solidFill>
-                  <a:schemeClr val="tx1"/>
-                </a:solidFill>
-                <a:latin typeface="+mn-lt"/>
-                <a:ea typeface="+mn-ea"/>
-                <a:cs typeface="+mn-cs"/>
-              </a:defRPr>
-            </a:lvl6pPr>
-            <a:lvl7pPr marL="1911096" indent="-228600" algn="l" rtl="0" eaLnBrk="1" latinLnBrk="0" hangingPunct="1">
-              <a:spcBef>
-                <a:spcPct val="20000"/>
-              </a:spcBef>
-              <a:buClr>
-                <a:schemeClr val="tx2"/>
-              </a:buClr>
-              <a:buFont typeface="Wingdings 2"/>
-              <a:buChar char=""/>
-              <a:defRPr sz="1600" kern="1200">
-                <a:solidFill>
-                  <a:schemeClr val="tx1"/>
-                </a:solidFill>
-                <a:latin typeface="+mn-lt"/>
-                <a:ea typeface="+mn-ea"/>
-                <a:cs typeface="+mn-cs"/>
-              </a:defRPr>
-            </a:lvl7pPr>
-            <a:lvl8pPr marL="2121408" indent="-182880" algn="l" rtl="0" eaLnBrk="1" latinLnBrk="0" hangingPunct="1">
-              <a:spcBef>
-                <a:spcPct val="20000"/>
-              </a:spcBef>
-              <a:buClr>
-                <a:schemeClr val="tx2"/>
-              </a:buClr>
-              <a:buFont typeface="Wingdings 2"/>
-              <a:buChar char=""/>
-              <a:defRPr sz="1400" kern="1200">
-                <a:solidFill>
-                  <a:schemeClr val="tx1"/>
-                </a:solidFill>
-                <a:latin typeface="+mn-lt"/>
-                <a:ea typeface="+mn-ea"/>
-                <a:cs typeface="+mn-cs"/>
-              </a:defRPr>
-            </a:lvl8pPr>
-            <a:lvl9pPr marL="2322576" indent="-182880" algn="l" rtl="0" eaLnBrk="1" latinLnBrk="0" hangingPunct="1">
-              <a:spcBef>
-                <a:spcPct val="20000"/>
-              </a:spcBef>
-              <a:buClr>
-                <a:schemeClr val="tx2"/>
-              </a:buClr>
-              <a:buFont typeface="Wingdings 2"/>
-              <a:buChar char=""/>
-              <a:defRPr sz="1400" kern="1200">
-                <a:solidFill>
-                  <a:schemeClr val="tx1"/>
-                </a:solidFill>
-                <a:latin typeface="+mn-lt"/>
-                <a:ea typeface="+mn-ea"/>
-                <a:cs typeface="+mn-cs"/>
-              </a:defRPr>
-            </a:lvl9pPr>
-          </a:lstStyle>
-          <a:p>
-            <a:r>
-              <a:rPr lang="en-US" dirty="0" smtClean="0"/>
-              <a:t>Telerik Software Academy</a:t>
-            </a:r>
-            <a:endParaRPr lang="en-US" dirty="0"/>
-          </a:p>
-        </p:txBody>
-      </p:sp>
-      <p:sp>
-        <p:nvSpPr>
-          <p:cNvPr id="36" name="Text Placeholder 6"/>
-          <p:cNvSpPr>
-            <a:spLocks noGrp="1"/>
-          </p:cNvSpPr>
-          <p:nvPr/>
-        </p:nvSpPr>
-        <p:spPr>
-          <a:xfrm>
-            <a:off x="419101" y="6062246"/>
-            <a:ext cx="3012477" cy="338554"/>
-          </a:xfrm>
-          <a:prstGeom prst="rect">
-            <a:avLst/>
-          </a:prstGeom>
-          <a:noFill/>
-        </p:spPr>
-        <p:txBody>
-          <a:bodyPr wrap="square" rtlCol="0">
-            <a:spAutoFit/>
-          </a:bodyPr>
-          <a:lstStyle>
-            <a:lvl1pPr marL="319088" indent="-319088" algn="l" rtl="0" eaLnBrk="0" fontAlgn="base" hangingPunct="0">
-              <a:spcBef>
-                <a:spcPct val="0"/>
-              </a:spcBef>
-              <a:spcAft>
-                <a:spcPct val="0"/>
-              </a:spcAft>
-              <a:buClr>
-                <a:schemeClr val="accent5">
-                  <a:lumMod val="40000"/>
-                  <a:lumOff val="60000"/>
-                </a:schemeClr>
-              </a:buClr>
-              <a:buSzPct val="70000"/>
-              <a:buFont typeface="Wingdings 2" pitchFamily="18" charset="2"/>
-              <a:buNone/>
-              <a:defRPr lang="en-US" sz="1600" b="1" kern="1200" dirty="0" smtClean="0">
-                <a:solidFill>
-                  <a:srgbClr val="0EFE58"/>
-                </a:solidFill>
-                <a:effectLst>
-                  <a:outerShdw blurRad="38100" dist="38100" dir="2700000" algn="tl">
-                    <a:srgbClr val="000000">
-                      <a:alpha val="43137"/>
-                    </a:srgbClr>
-                  </a:outerShdw>
-                </a:effectLst>
-                <a:latin typeface="Corbel" pitchFamily="34" charset="0"/>
-                <a:ea typeface="+mn-ea"/>
-                <a:cs typeface="+mn-cs"/>
-              </a:defRPr>
-            </a:lvl1pPr>
-            <a:lvl2pPr marL="630238" indent="-273050" algn="l" rtl="0" eaLnBrk="0" fontAlgn="base" hangingPunct="0">
-              <a:spcBef>
-                <a:spcPct val="20000"/>
-              </a:spcBef>
-              <a:spcAft>
-                <a:spcPct val="0"/>
-              </a:spcAft>
-              <a:buClr>
-                <a:schemeClr val="accent2">
-                  <a:lumMod val="60000"/>
-                  <a:lumOff val="40000"/>
-                </a:schemeClr>
-              </a:buClr>
-              <a:buFont typeface="Wingdings 2" pitchFamily="18" charset="2"/>
-              <a:buChar char=""/>
-              <a:defRPr sz="3000" b="1" kern="1200">
-                <a:solidFill>
-                  <a:schemeClr val="tx1">
-                    <a:lumMod val="20000"/>
-                    <a:lumOff val="80000"/>
-                  </a:schemeClr>
-                </a:solidFill>
-                <a:effectLst>
-                  <a:outerShdw blurRad="38100" dist="38100" dir="2700000" algn="tl">
-                    <a:srgbClr val="000000">
-                      <a:alpha val="43137"/>
-                    </a:srgbClr>
-                  </a:outerShdw>
-                </a:effectLst>
-                <a:latin typeface="+mn-lt"/>
-                <a:ea typeface="+mn-ea"/>
-                <a:cs typeface="+mn-cs"/>
-              </a:defRPr>
-            </a:lvl2pPr>
-            <a:lvl3pPr marL="922338" indent="-273050" algn="l" rtl="0" eaLnBrk="0" fontAlgn="base" hangingPunct="0">
-              <a:spcBef>
-                <a:spcPct val="20000"/>
-              </a:spcBef>
-              <a:spcAft>
-                <a:spcPct val="0"/>
-              </a:spcAft>
-              <a:buClr>
-                <a:schemeClr val="tx1">
-                  <a:lumMod val="50000"/>
-                </a:schemeClr>
-              </a:buClr>
-              <a:buFont typeface="Wingdings 2" pitchFamily="18" charset="2"/>
-              <a:buChar char=""/>
-              <a:defRPr sz="2800" b="1" kern="1200">
-                <a:solidFill>
-                  <a:schemeClr val="tx1">
-                    <a:lumMod val="20000"/>
-                    <a:lumOff val="80000"/>
-                  </a:schemeClr>
-                </a:solidFill>
-                <a:effectLst>
-                  <a:outerShdw blurRad="38100" dist="38100" dir="2700000" algn="tl">
-                    <a:srgbClr val="000000">
-                      <a:alpha val="43137"/>
-                    </a:srgbClr>
-                  </a:outerShdw>
-                </a:effectLst>
-                <a:latin typeface="+mn-lt"/>
-                <a:ea typeface="+mn-ea"/>
-                <a:cs typeface="+mn-cs"/>
-              </a:defRPr>
-            </a:lvl3pPr>
-            <a:lvl4pPr marL="1187450" indent="-228600" algn="l" rtl="0" eaLnBrk="0" fontAlgn="base" hangingPunct="0">
-              <a:spcBef>
-                <a:spcPct val="20000"/>
-              </a:spcBef>
-              <a:spcAft>
-                <a:spcPct val="0"/>
-              </a:spcAft>
-              <a:buClr>
-                <a:srgbClr val="F8BD52"/>
-              </a:buClr>
-              <a:buFont typeface="Wingdings 2" pitchFamily="18" charset="2"/>
-              <a:buChar char=""/>
-              <a:defRPr sz="2600" b="1" kern="1200">
-                <a:solidFill>
-                  <a:schemeClr val="tx1">
-                    <a:lumMod val="20000"/>
-                    <a:lumOff val="80000"/>
-                  </a:schemeClr>
-                </a:solidFill>
-                <a:effectLst>
-                  <a:outerShdw blurRad="38100" dist="38100" dir="2700000" algn="tl">
-                    <a:srgbClr val="000000">
-                      <a:alpha val="43137"/>
-                    </a:srgbClr>
-                  </a:outerShdw>
-                </a:effectLst>
-                <a:latin typeface="+mn-lt"/>
-                <a:ea typeface="+mn-ea"/>
-                <a:cs typeface="+mn-cs"/>
-              </a:defRPr>
-            </a:lvl4pPr>
-            <a:lvl5pPr marL="1425575" indent="-228600" algn="l" rtl="0" eaLnBrk="0" fontAlgn="base" hangingPunct="0">
-              <a:spcBef>
-                <a:spcPct val="20000"/>
-              </a:spcBef>
-              <a:spcAft>
-                <a:spcPct val="0"/>
-              </a:spcAft>
-              <a:buClr>
-                <a:srgbClr val="46A6BD"/>
-              </a:buClr>
-              <a:buFont typeface="Wingdings 2" pitchFamily="18" charset="2"/>
-              <a:buChar char=""/>
-              <a:defRPr sz="2400" b="1" kern="1200">
-                <a:solidFill>
-                  <a:schemeClr val="tx1">
-                    <a:lumMod val="20000"/>
-                    <a:lumOff val="80000"/>
-                  </a:schemeClr>
-                </a:solidFill>
-                <a:effectLst>
-                  <a:outerShdw blurRad="38100" dist="38100" dir="2700000" algn="tl">
-                    <a:srgbClr val="000000">
-                      <a:alpha val="43137"/>
-                    </a:srgbClr>
-                  </a:outerShdw>
-                </a:effectLst>
-                <a:latin typeface="+mn-lt"/>
-                <a:ea typeface="+mn-ea"/>
-                <a:cs typeface="+mn-cs"/>
-              </a:defRPr>
-            </a:lvl5pPr>
-            <a:lvl6pPr marL="1673352" indent="-228600" algn="l" rtl="0" eaLnBrk="1" latinLnBrk="0" hangingPunct="1">
-              <a:spcBef>
-                <a:spcPct val="20000"/>
-              </a:spcBef>
-              <a:buClr>
-                <a:schemeClr val="accent6"/>
-              </a:buClr>
-              <a:buFont typeface="Wingdings 2"/>
-              <a:buChar char=""/>
-              <a:defRPr sz="1800" kern="1200">
-                <a:solidFill>
-                  <a:schemeClr val="tx1"/>
-                </a:solidFill>
-                <a:latin typeface="+mn-lt"/>
-                <a:ea typeface="+mn-ea"/>
-                <a:cs typeface="+mn-cs"/>
-              </a:defRPr>
-            </a:lvl6pPr>
-            <a:lvl7pPr marL="1911096" indent="-228600" algn="l" rtl="0" eaLnBrk="1" latinLnBrk="0" hangingPunct="1">
-              <a:spcBef>
-                <a:spcPct val="20000"/>
-              </a:spcBef>
-              <a:buClr>
-                <a:schemeClr val="tx2"/>
-              </a:buClr>
-              <a:buFont typeface="Wingdings 2"/>
-              <a:buChar char=""/>
-              <a:defRPr sz="1600" kern="1200">
-                <a:solidFill>
-                  <a:schemeClr val="tx1"/>
-                </a:solidFill>
-                <a:latin typeface="+mn-lt"/>
-                <a:ea typeface="+mn-ea"/>
-                <a:cs typeface="+mn-cs"/>
-              </a:defRPr>
-            </a:lvl7pPr>
-            <a:lvl8pPr marL="2121408" indent="-182880" algn="l" rtl="0" eaLnBrk="1" latinLnBrk="0" hangingPunct="1">
-              <a:spcBef>
-                <a:spcPct val="20000"/>
-              </a:spcBef>
-              <a:buClr>
-                <a:schemeClr val="tx2"/>
-              </a:buClr>
-              <a:buFont typeface="Wingdings 2"/>
-              <a:buChar char=""/>
-              <a:defRPr sz="1400" kern="1200">
-                <a:solidFill>
-                  <a:schemeClr val="tx1"/>
-                </a:solidFill>
-                <a:latin typeface="+mn-lt"/>
-                <a:ea typeface="+mn-ea"/>
-                <a:cs typeface="+mn-cs"/>
-              </a:defRPr>
-            </a:lvl8pPr>
-            <a:lvl9pPr marL="2322576" indent="-182880" algn="l" rtl="0" eaLnBrk="1" latinLnBrk="0" hangingPunct="1">
-              <a:spcBef>
-                <a:spcPct val="20000"/>
-              </a:spcBef>
-              <a:buClr>
-                <a:schemeClr val="tx2"/>
-              </a:buClr>
-              <a:buFont typeface="Wingdings 2"/>
-              <a:buChar char=""/>
-              <a:defRPr sz="1400" kern="1200">
-                <a:solidFill>
-                  <a:schemeClr val="tx1"/>
-                </a:solidFill>
-                <a:latin typeface="+mn-lt"/>
-                <a:ea typeface="+mn-ea"/>
-                <a:cs typeface="+mn-cs"/>
-              </a:defRPr>
-            </a:lvl9pPr>
-          </a:lstStyle>
-          <a:p>
-            <a:r>
-              <a:rPr lang="en-US" dirty="0" smtClean="0">
-                <a:hlinkClick r:id="rId6"/>
-              </a:rPr>
-              <a:t>academy.telerik.com</a:t>
-            </a:r>
-            <a:r>
-              <a:rPr lang="en-US" dirty="0" smtClean="0"/>
-              <a:t>   </a:t>
-            </a:r>
-            <a:endParaRPr lang="en-US" dirty="0"/>
-          </a:p>
-        </p:txBody>
-      </p:sp>
-      <p:sp>
-        <p:nvSpPr>
-          <p:cNvPr id="37" name="Text Placeholder 3"/>
-          <p:cNvSpPr>
-            <a:spLocks noGrp="1"/>
-          </p:cNvSpPr>
-          <p:nvPr/>
-        </p:nvSpPr>
-        <p:spPr>
-          <a:xfrm>
-            <a:off x="393701" y="4953000"/>
-            <a:ext cx="3035299" cy="461665"/>
-          </a:xfrm>
-          <a:prstGeom prst="rect">
-            <a:avLst/>
-          </a:prstGeom>
-          <a:noFill/>
-        </p:spPr>
-        <p:txBody>
-          <a:bodyPr wrap="square" rtlCol="0">
-            <a:spAutoFit/>
-          </a:bodyPr>
-          <a:lstStyle>
-            <a:lvl1pPr marL="319088" indent="-319088" algn="l" rtl="0" eaLnBrk="0" fontAlgn="base" hangingPunct="0">
-              <a:spcBef>
-                <a:spcPct val="0"/>
-              </a:spcBef>
-              <a:spcAft>
-                <a:spcPct val="0"/>
-              </a:spcAft>
-              <a:buClr>
-                <a:schemeClr val="accent5">
-                  <a:lumMod val="40000"/>
-                  <a:lumOff val="60000"/>
-                </a:schemeClr>
-              </a:buClr>
-              <a:buSzPct val="70000"/>
-              <a:buFont typeface="Wingdings 2" pitchFamily="18" charset="2"/>
-              <a:buNone/>
-              <a:defRPr lang="en-US" sz="2300" b="1" kern="1200" dirty="0" smtClean="0">
-                <a:solidFill>
-                  <a:schemeClr val="tx2">
-                    <a:lumMod val="50000"/>
-                  </a:schemeClr>
-                </a:solidFill>
-                <a:effectLst>
-                  <a:outerShdw blurRad="38100" dist="38100" dir="2700000" algn="tl">
-                    <a:srgbClr val="000000">
-                      <a:alpha val="43137"/>
-                    </a:srgbClr>
-                  </a:outerShdw>
-                </a:effectLst>
-                <a:latin typeface="Corbel" pitchFamily="34" charset="0"/>
-                <a:ea typeface="+mn-ea"/>
-                <a:cs typeface="+mn-cs"/>
-              </a:defRPr>
-            </a:lvl1pPr>
-            <a:lvl2pPr marL="630238" indent="-273050" algn="l" rtl="0" eaLnBrk="0" fontAlgn="base" hangingPunct="0">
-              <a:spcBef>
-                <a:spcPct val="20000"/>
-              </a:spcBef>
-              <a:spcAft>
-                <a:spcPct val="0"/>
-              </a:spcAft>
-              <a:buClr>
-                <a:schemeClr val="accent2">
-                  <a:lumMod val="60000"/>
-                  <a:lumOff val="40000"/>
-                </a:schemeClr>
-              </a:buClr>
-              <a:buFont typeface="Wingdings 2" pitchFamily="18" charset="2"/>
-              <a:buChar char=""/>
-              <a:defRPr sz="3000" b="1" kern="1200">
-                <a:solidFill>
-                  <a:schemeClr val="tx1">
-                    <a:lumMod val="20000"/>
-                    <a:lumOff val="80000"/>
-                  </a:schemeClr>
-                </a:solidFill>
-                <a:effectLst>
-                  <a:outerShdw blurRad="38100" dist="38100" dir="2700000" algn="tl">
-                    <a:srgbClr val="000000">
-                      <a:alpha val="43137"/>
-                    </a:srgbClr>
-                  </a:outerShdw>
-                </a:effectLst>
-                <a:latin typeface="+mn-lt"/>
-                <a:ea typeface="+mn-ea"/>
-                <a:cs typeface="+mn-cs"/>
-              </a:defRPr>
-            </a:lvl2pPr>
-            <a:lvl3pPr marL="922338" indent="-273050" algn="l" rtl="0" eaLnBrk="0" fontAlgn="base" hangingPunct="0">
-              <a:spcBef>
-                <a:spcPct val="20000"/>
-              </a:spcBef>
-              <a:spcAft>
-                <a:spcPct val="0"/>
-              </a:spcAft>
-              <a:buClr>
-                <a:schemeClr val="tx1">
-                  <a:lumMod val="50000"/>
-                </a:schemeClr>
-              </a:buClr>
-              <a:buFont typeface="Wingdings 2" pitchFamily="18" charset="2"/>
-              <a:buChar char=""/>
-              <a:defRPr sz="2800" b="1" kern="1200">
-                <a:solidFill>
-                  <a:schemeClr val="tx1">
-                    <a:lumMod val="20000"/>
-                    <a:lumOff val="80000"/>
-                  </a:schemeClr>
-                </a:solidFill>
-                <a:effectLst>
-                  <a:outerShdw blurRad="38100" dist="38100" dir="2700000" algn="tl">
-                    <a:srgbClr val="000000">
-                      <a:alpha val="43137"/>
-                    </a:srgbClr>
-                  </a:outerShdw>
-                </a:effectLst>
-                <a:latin typeface="+mn-lt"/>
-                <a:ea typeface="+mn-ea"/>
-                <a:cs typeface="+mn-cs"/>
-              </a:defRPr>
-            </a:lvl3pPr>
-            <a:lvl4pPr marL="1187450" indent="-228600" algn="l" rtl="0" eaLnBrk="0" fontAlgn="base" hangingPunct="0">
-              <a:spcBef>
-                <a:spcPct val="20000"/>
-              </a:spcBef>
-              <a:spcAft>
-                <a:spcPct val="0"/>
-              </a:spcAft>
-              <a:buClr>
-                <a:srgbClr val="F8BD52"/>
-              </a:buClr>
-              <a:buFont typeface="Wingdings 2" pitchFamily="18" charset="2"/>
-              <a:buChar char=""/>
-              <a:defRPr sz="2600" b="1" kern="1200">
-                <a:solidFill>
-                  <a:schemeClr val="tx1">
-                    <a:lumMod val="20000"/>
-                    <a:lumOff val="80000"/>
-                  </a:schemeClr>
-                </a:solidFill>
-                <a:effectLst>
-                  <a:outerShdw blurRad="38100" dist="38100" dir="2700000" algn="tl">
-                    <a:srgbClr val="000000">
-                      <a:alpha val="43137"/>
-                    </a:srgbClr>
-                  </a:outerShdw>
-                </a:effectLst>
-                <a:latin typeface="+mn-lt"/>
-                <a:ea typeface="+mn-ea"/>
-                <a:cs typeface="+mn-cs"/>
-              </a:defRPr>
-            </a:lvl4pPr>
-            <a:lvl5pPr marL="1425575" indent="-228600" algn="l" rtl="0" eaLnBrk="0" fontAlgn="base" hangingPunct="0">
-              <a:spcBef>
-                <a:spcPct val="20000"/>
-              </a:spcBef>
-              <a:spcAft>
-                <a:spcPct val="0"/>
-              </a:spcAft>
-              <a:buClr>
-                <a:srgbClr val="46A6BD"/>
-              </a:buClr>
-              <a:buFont typeface="Wingdings 2" pitchFamily="18" charset="2"/>
-              <a:buChar char=""/>
-              <a:defRPr sz="2400" b="1" kern="1200">
-                <a:solidFill>
-                  <a:schemeClr val="tx1">
-                    <a:lumMod val="20000"/>
-                    <a:lumOff val="80000"/>
-                  </a:schemeClr>
-                </a:solidFill>
-                <a:effectLst>
-                  <a:outerShdw blurRad="38100" dist="38100" dir="2700000" algn="tl">
-                    <a:srgbClr val="000000">
-                      <a:alpha val="43137"/>
-                    </a:srgbClr>
-                  </a:outerShdw>
-                </a:effectLst>
-                <a:latin typeface="+mn-lt"/>
-                <a:ea typeface="+mn-ea"/>
-                <a:cs typeface="+mn-cs"/>
-              </a:defRPr>
-            </a:lvl5pPr>
-            <a:lvl6pPr marL="1673352" indent="-228600" algn="l" rtl="0" eaLnBrk="1" latinLnBrk="0" hangingPunct="1">
-              <a:spcBef>
-                <a:spcPct val="20000"/>
-              </a:spcBef>
-              <a:buClr>
-                <a:schemeClr val="accent6"/>
-              </a:buClr>
-              <a:buFont typeface="Wingdings 2"/>
-              <a:buChar char=""/>
-              <a:defRPr sz="1800" kern="1200">
-                <a:solidFill>
-                  <a:schemeClr val="tx1"/>
-                </a:solidFill>
-                <a:latin typeface="+mn-lt"/>
-                <a:ea typeface="+mn-ea"/>
-                <a:cs typeface="+mn-cs"/>
-              </a:defRPr>
-            </a:lvl6pPr>
-            <a:lvl7pPr marL="1911096" indent="-228600" algn="l" rtl="0" eaLnBrk="1" latinLnBrk="0" hangingPunct="1">
-              <a:spcBef>
-                <a:spcPct val="20000"/>
-              </a:spcBef>
-              <a:buClr>
-                <a:schemeClr val="tx2"/>
-              </a:buClr>
-              <a:buFont typeface="Wingdings 2"/>
-              <a:buChar char=""/>
-              <a:defRPr sz="1600" kern="1200">
-                <a:solidFill>
-                  <a:schemeClr val="tx1"/>
-                </a:solidFill>
-                <a:latin typeface="+mn-lt"/>
-                <a:ea typeface="+mn-ea"/>
-                <a:cs typeface="+mn-cs"/>
-              </a:defRPr>
-            </a:lvl7pPr>
-            <a:lvl8pPr marL="2121408" indent="-182880" algn="l" rtl="0" eaLnBrk="1" latinLnBrk="0" hangingPunct="1">
-              <a:spcBef>
-                <a:spcPct val="20000"/>
-              </a:spcBef>
-              <a:buClr>
-                <a:schemeClr val="tx2"/>
-              </a:buClr>
-              <a:buFont typeface="Wingdings 2"/>
-              <a:buChar char=""/>
-              <a:defRPr sz="1400" kern="1200">
-                <a:solidFill>
-                  <a:schemeClr val="tx1"/>
-                </a:solidFill>
-                <a:latin typeface="+mn-lt"/>
-                <a:ea typeface="+mn-ea"/>
-                <a:cs typeface="+mn-cs"/>
-              </a:defRPr>
-            </a:lvl8pPr>
-            <a:lvl9pPr marL="2322576" indent="-182880" algn="l" rtl="0" eaLnBrk="1" latinLnBrk="0" hangingPunct="1">
-              <a:spcBef>
-                <a:spcPct val="20000"/>
-              </a:spcBef>
-              <a:buClr>
-                <a:schemeClr val="tx2"/>
-              </a:buClr>
-              <a:buFont typeface="Wingdings 2"/>
-              <a:buChar char=""/>
-              <a:defRPr sz="1400" kern="1200">
-                <a:solidFill>
-                  <a:schemeClr val="tx1"/>
-                </a:solidFill>
-                <a:latin typeface="+mn-lt"/>
-                <a:ea typeface="+mn-ea"/>
-                <a:cs typeface="+mn-cs"/>
-              </a:defRPr>
-            </a:lvl9pPr>
-          </a:lstStyle>
-          <a:p>
-            <a:r>
-              <a:rPr lang="en-US" dirty="0" smtClean="0"/>
-              <a:t>Technical Trainer</a:t>
-            </a:r>
-            <a:endParaRPr lang="en-US" dirty="0"/>
-          </a:p>
-        </p:txBody>
-      </p:sp>
-      <p:sp>
-        <p:nvSpPr>
-          <p:cNvPr id="38" name="Text Placeholder 5"/>
-          <p:cNvSpPr>
-            <a:spLocks noGrp="1"/>
-          </p:cNvSpPr>
-          <p:nvPr/>
-        </p:nvSpPr>
-        <p:spPr>
-          <a:xfrm>
-            <a:off x="419101" y="5329535"/>
-            <a:ext cx="3012477" cy="369332"/>
-          </a:xfrm>
-          <a:prstGeom prst="rect">
-            <a:avLst/>
-          </a:prstGeom>
-          <a:noFill/>
-        </p:spPr>
-        <p:txBody>
-          <a:bodyPr wrap="square" rtlCol="0">
-            <a:spAutoFit/>
-          </a:bodyPr>
-          <a:lstStyle>
-            <a:lvl1pPr marL="319088" indent="-319088" algn="l" rtl="0" eaLnBrk="0" fontAlgn="base" hangingPunct="0">
-              <a:spcBef>
-                <a:spcPct val="0"/>
-              </a:spcBef>
-              <a:spcAft>
-                <a:spcPct val="0"/>
-              </a:spcAft>
-              <a:buClr>
-                <a:schemeClr val="accent5">
-                  <a:lumMod val="40000"/>
-                  <a:lumOff val="60000"/>
-                </a:schemeClr>
-              </a:buClr>
-              <a:buSzPct val="70000"/>
-              <a:buFont typeface="Wingdings 2" pitchFamily="18" charset="2"/>
-              <a:buNone/>
-              <a:defRPr lang="en-US" sz="2000" b="1" kern="1200" dirty="0" smtClean="0">
-                <a:solidFill>
-                  <a:schemeClr val="tx2">
-                    <a:lumMod val="50000"/>
-                  </a:schemeClr>
-                </a:solidFill>
-                <a:effectLst>
-                  <a:outerShdw blurRad="38100" dist="38100" dir="2700000" algn="tl">
-                    <a:srgbClr val="000000">
-                      <a:alpha val="43137"/>
-                    </a:srgbClr>
-                  </a:outerShdw>
-                </a:effectLst>
-                <a:latin typeface="Corbel" pitchFamily="34" charset="0"/>
-                <a:ea typeface="+mn-ea"/>
-                <a:cs typeface="+mn-cs"/>
-              </a:defRPr>
-            </a:lvl1pPr>
-            <a:lvl2pPr marL="630238" indent="-273050" algn="l" rtl="0" eaLnBrk="0" fontAlgn="base" hangingPunct="0">
-              <a:spcBef>
-                <a:spcPct val="20000"/>
-              </a:spcBef>
-              <a:spcAft>
-                <a:spcPct val="0"/>
-              </a:spcAft>
-              <a:buClr>
-                <a:schemeClr val="accent2">
-                  <a:lumMod val="60000"/>
-                  <a:lumOff val="40000"/>
-                </a:schemeClr>
-              </a:buClr>
-              <a:buFont typeface="Wingdings 2" pitchFamily="18" charset="2"/>
-              <a:buChar char=""/>
-              <a:defRPr sz="3000" b="1" kern="1200">
-                <a:solidFill>
-                  <a:schemeClr val="tx1">
-                    <a:lumMod val="20000"/>
-                    <a:lumOff val="80000"/>
-                  </a:schemeClr>
-                </a:solidFill>
-                <a:effectLst>
-                  <a:outerShdw blurRad="38100" dist="38100" dir="2700000" algn="tl">
-                    <a:srgbClr val="000000">
-                      <a:alpha val="43137"/>
-                    </a:srgbClr>
-                  </a:outerShdw>
-                </a:effectLst>
-                <a:latin typeface="+mn-lt"/>
-                <a:ea typeface="+mn-ea"/>
-                <a:cs typeface="+mn-cs"/>
-              </a:defRPr>
-            </a:lvl2pPr>
-            <a:lvl3pPr marL="922338" indent="-273050" algn="l" rtl="0" eaLnBrk="0" fontAlgn="base" hangingPunct="0">
-              <a:spcBef>
-                <a:spcPct val="20000"/>
-              </a:spcBef>
-              <a:spcAft>
-                <a:spcPct val="0"/>
-              </a:spcAft>
-              <a:buClr>
-                <a:schemeClr val="tx1">
-                  <a:lumMod val="50000"/>
-                </a:schemeClr>
-              </a:buClr>
-              <a:buFont typeface="Wingdings 2" pitchFamily="18" charset="2"/>
-              <a:buChar char=""/>
-              <a:defRPr sz="2800" b="1" kern="1200">
-                <a:solidFill>
-                  <a:schemeClr val="tx1">
-                    <a:lumMod val="20000"/>
-                    <a:lumOff val="80000"/>
-                  </a:schemeClr>
-                </a:solidFill>
-                <a:effectLst>
-                  <a:outerShdw blurRad="38100" dist="38100" dir="2700000" algn="tl">
-                    <a:srgbClr val="000000">
-                      <a:alpha val="43137"/>
-                    </a:srgbClr>
-                  </a:outerShdw>
-                </a:effectLst>
-                <a:latin typeface="+mn-lt"/>
-                <a:ea typeface="+mn-ea"/>
-                <a:cs typeface="+mn-cs"/>
-              </a:defRPr>
-            </a:lvl3pPr>
-            <a:lvl4pPr marL="1187450" indent="-228600" algn="l" rtl="0" eaLnBrk="0" fontAlgn="base" hangingPunct="0">
-              <a:spcBef>
-                <a:spcPct val="20000"/>
-              </a:spcBef>
-              <a:spcAft>
-                <a:spcPct val="0"/>
-              </a:spcAft>
-              <a:buClr>
-                <a:srgbClr val="F8BD52"/>
-              </a:buClr>
-              <a:buFont typeface="Wingdings 2" pitchFamily="18" charset="2"/>
-              <a:buChar char=""/>
-              <a:defRPr sz="2600" b="1" kern="1200">
-                <a:solidFill>
-                  <a:schemeClr val="tx1">
-                    <a:lumMod val="20000"/>
-                    <a:lumOff val="80000"/>
-                  </a:schemeClr>
-                </a:solidFill>
-                <a:effectLst>
-                  <a:outerShdw blurRad="38100" dist="38100" dir="2700000" algn="tl">
-                    <a:srgbClr val="000000">
-                      <a:alpha val="43137"/>
-                    </a:srgbClr>
-                  </a:outerShdw>
-                </a:effectLst>
-                <a:latin typeface="+mn-lt"/>
-                <a:ea typeface="+mn-ea"/>
-                <a:cs typeface="+mn-cs"/>
-              </a:defRPr>
-            </a:lvl4pPr>
-            <a:lvl5pPr marL="1425575" indent="-228600" algn="l" rtl="0" eaLnBrk="0" fontAlgn="base" hangingPunct="0">
-              <a:spcBef>
-                <a:spcPct val="20000"/>
-              </a:spcBef>
-              <a:spcAft>
-                <a:spcPct val="0"/>
-              </a:spcAft>
-              <a:buClr>
-                <a:srgbClr val="46A6BD"/>
-              </a:buClr>
-              <a:buFont typeface="Wingdings 2" pitchFamily="18" charset="2"/>
-              <a:buChar char=""/>
-              <a:defRPr sz="2400" b="1" kern="1200">
-                <a:solidFill>
-                  <a:schemeClr val="tx1">
-                    <a:lumMod val="20000"/>
-                    <a:lumOff val="80000"/>
-                  </a:schemeClr>
-                </a:solidFill>
-                <a:effectLst>
-                  <a:outerShdw blurRad="38100" dist="38100" dir="2700000" algn="tl">
-                    <a:srgbClr val="000000">
-                      <a:alpha val="43137"/>
-                    </a:srgbClr>
-                  </a:outerShdw>
-                </a:effectLst>
-                <a:latin typeface="+mn-lt"/>
-                <a:ea typeface="+mn-ea"/>
-                <a:cs typeface="+mn-cs"/>
-              </a:defRPr>
-            </a:lvl5pPr>
-            <a:lvl6pPr marL="1673352" indent="-228600" algn="l" rtl="0" eaLnBrk="1" latinLnBrk="0" hangingPunct="1">
-              <a:spcBef>
-                <a:spcPct val="20000"/>
-              </a:spcBef>
-              <a:buClr>
-                <a:schemeClr val="accent6"/>
-              </a:buClr>
-              <a:buFont typeface="Wingdings 2"/>
-              <a:buChar char=""/>
-              <a:defRPr sz="1800" kern="1200">
-                <a:solidFill>
-                  <a:schemeClr val="tx1"/>
-                </a:solidFill>
-                <a:latin typeface="+mn-lt"/>
-                <a:ea typeface="+mn-ea"/>
-                <a:cs typeface="+mn-cs"/>
-              </a:defRPr>
-            </a:lvl6pPr>
-            <a:lvl7pPr marL="1911096" indent="-228600" algn="l" rtl="0" eaLnBrk="1" latinLnBrk="0" hangingPunct="1">
-              <a:spcBef>
-                <a:spcPct val="20000"/>
-              </a:spcBef>
-              <a:buClr>
-                <a:schemeClr val="tx2"/>
-              </a:buClr>
-              <a:buFont typeface="Wingdings 2"/>
-              <a:buChar char=""/>
-              <a:defRPr sz="1600" kern="1200">
-                <a:solidFill>
-                  <a:schemeClr val="tx1"/>
-                </a:solidFill>
-                <a:latin typeface="+mn-lt"/>
-                <a:ea typeface="+mn-ea"/>
-                <a:cs typeface="+mn-cs"/>
-              </a:defRPr>
-            </a:lvl7pPr>
-            <a:lvl8pPr marL="2121408" indent="-182880" algn="l" rtl="0" eaLnBrk="1" latinLnBrk="0" hangingPunct="1">
-              <a:spcBef>
-                <a:spcPct val="20000"/>
-              </a:spcBef>
-              <a:buClr>
-                <a:schemeClr val="tx2"/>
-              </a:buClr>
-              <a:buFont typeface="Wingdings 2"/>
-              <a:buChar char=""/>
-              <a:defRPr sz="1400" kern="1200">
-                <a:solidFill>
-                  <a:schemeClr val="tx1"/>
-                </a:solidFill>
-                <a:latin typeface="+mn-lt"/>
-                <a:ea typeface="+mn-ea"/>
-                <a:cs typeface="+mn-cs"/>
-              </a:defRPr>
-            </a:lvl8pPr>
-            <a:lvl9pPr marL="2322576" indent="-182880" algn="l" rtl="0" eaLnBrk="1" latinLnBrk="0" hangingPunct="1">
-              <a:spcBef>
-                <a:spcPct val="20000"/>
-              </a:spcBef>
-              <a:buClr>
-                <a:schemeClr val="tx2"/>
-              </a:buClr>
-              <a:buFont typeface="Wingdings 2"/>
-              <a:buChar char=""/>
-              <a:defRPr sz="1400" kern="1200">
-                <a:solidFill>
-                  <a:schemeClr val="tx1"/>
-                </a:solidFill>
-                <a:latin typeface="+mn-lt"/>
-                <a:ea typeface="+mn-ea"/>
-                <a:cs typeface="+mn-cs"/>
-              </a:defRPr>
-            </a:lvl9pPr>
-          </a:lstStyle>
-          <a:p>
-            <a:r>
-              <a:rPr lang="en-US" sz="1800" dirty="0" smtClean="0">
-                <a:hlinkClick r:id="rId7"/>
-              </a:rPr>
-              <a:t>www.nakov.com</a:t>
-            </a:r>
-            <a:endParaRPr lang="en-US" sz="1800" dirty="0"/>
-          </a:p>
-        </p:txBody>
-      </p:sp>
       <p:sp>
         <p:nvSpPr>
           <p:cNvPr id="39" name="TextBox 38"/>
@@ -11331,11 +9986,11 @@
           <p:nvPr/>
         </p:nvPicPr>
         <p:blipFill>
-          <a:blip r:embed="rId8" cstate="screen">
+          <a:blip r:embed="rId6" cstate="screen">
             <a:extLst>
               <a:ext uri="{BEBA8EAE-BF5A-486C-A8C5-ECC9F3942E4B}">
                 <a14:imgProps xmlns:a14="http://schemas.microsoft.com/office/drawing/2010/main">
-                  <a14:imgLayer r:embed="rId9">
+                  <a14:imgLayer r:embed="rId7">
                     <a14:imgEffect>
                       <a14:brightnessContrast bright="-20000" contrast="20000"/>
                     </a14:imgEffect>
@@ -11372,6 +10027,818 @@
           </a:extLst>
         </p:spPr>
       </p:pic>
+      <p:sp>
+        <p:nvSpPr>
+          <p:cNvPr id="15" name="Text Placeholder 6"/>
+          <p:cNvSpPr>
+            <a:spLocks noGrp="1"/>
+          </p:cNvSpPr>
+          <p:nvPr/>
+        </p:nvSpPr>
+        <p:spPr>
+          <a:xfrm>
+            <a:off x="202285" y="5583137"/>
+            <a:ext cx="3990513" cy="400110"/>
+          </a:xfrm>
+          <a:prstGeom prst="rect">
+            <a:avLst/>
+          </a:prstGeom>
+          <a:noFill/>
+        </p:spPr>
+        <p:txBody>
+          <a:bodyPr wrap="square" rtlCol="0">
+            <a:spAutoFit/>
+          </a:bodyPr>
+          <a:lstStyle>
+            <a:lvl1pPr marL="319088" indent="-319088" algn="l" rtl="0" eaLnBrk="0" fontAlgn="base" hangingPunct="0">
+              <a:spcBef>
+                <a:spcPct val="20000"/>
+              </a:spcBef>
+              <a:spcAft>
+                <a:spcPct val="0"/>
+              </a:spcAft>
+              <a:buClr>
+                <a:schemeClr val="accent5">
+                  <a:lumMod val="40000"/>
+                  <a:lumOff val="60000"/>
+                </a:schemeClr>
+              </a:buClr>
+              <a:buSzPct val="70000"/>
+              <a:buFont typeface="Wingdings 2" pitchFamily="18" charset="2"/>
+              <a:buNone/>
+              <a:defRPr lang="en-US" sz="2000" b="1" kern="1200" dirty="0">
+                <a:solidFill>
+                  <a:schemeClr val="tx2">
+                    <a:lumMod val="20000"/>
+                    <a:lumOff val="80000"/>
+                  </a:schemeClr>
+                </a:solidFill>
+                <a:effectLst>
+                  <a:outerShdw blurRad="38100" dist="38100" dir="2700000" algn="tl">
+                    <a:srgbClr val="000000">
+                      <a:alpha val="43137"/>
+                    </a:srgbClr>
+                  </a:outerShdw>
+                </a:effectLst>
+                <a:latin typeface="Corbel" pitchFamily="34" charset="0"/>
+                <a:ea typeface="+mn-ea"/>
+                <a:cs typeface="+mn-cs"/>
+              </a:defRPr>
+            </a:lvl1pPr>
+            <a:lvl2pPr marL="630238" indent="-273050" algn="l" rtl="0" eaLnBrk="0" fontAlgn="base" hangingPunct="0">
+              <a:spcBef>
+                <a:spcPct val="20000"/>
+              </a:spcBef>
+              <a:spcAft>
+                <a:spcPct val="0"/>
+              </a:spcAft>
+              <a:buClr>
+                <a:schemeClr val="accent2">
+                  <a:lumMod val="60000"/>
+                  <a:lumOff val="40000"/>
+                </a:schemeClr>
+              </a:buClr>
+              <a:buFont typeface="Wingdings 2" pitchFamily="18" charset="2"/>
+              <a:buChar char=""/>
+              <a:defRPr sz="3000" b="1" kern="1200">
+                <a:solidFill>
+                  <a:schemeClr val="tx1">
+                    <a:lumMod val="20000"/>
+                    <a:lumOff val="80000"/>
+                  </a:schemeClr>
+                </a:solidFill>
+                <a:effectLst>
+                  <a:outerShdw blurRad="38100" dist="38100" dir="2700000" algn="tl">
+                    <a:srgbClr val="000000">
+                      <a:alpha val="43137"/>
+                    </a:srgbClr>
+                  </a:outerShdw>
+                </a:effectLst>
+                <a:latin typeface="+mn-lt"/>
+                <a:ea typeface="+mn-ea"/>
+                <a:cs typeface="+mn-cs"/>
+              </a:defRPr>
+            </a:lvl2pPr>
+            <a:lvl3pPr marL="922338" indent="-273050" algn="l" rtl="0" eaLnBrk="0" fontAlgn="base" hangingPunct="0">
+              <a:spcBef>
+                <a:spcPct val="20000"/>
+              </a:spcBef>
+              <a:spcAft>
+                <a:spcPct val="0"/>
+              </a:spcAft>
+              <a:buClr>
+                <a:schemeClr val="tx1">
+                  <a:lumMod val="50000"/>
+                </a:schemeClr>
+              </a:buClr>
+              <a:buFont typeface="Wingdings 2" pitchFamily="18" charset="2"/>
+              <a:buChar char=""/>
+              <a:defRPr sz="2800" b="1" kern="1200">
+                <a:solidFill>
+                  <a:schemeClr val="tx1">
+                    <a:lumMod val="20000"/>
+                    <a:lumOff val="80000"/>
+                  </a:schemeClr>
+                </a:solidFill>
+                <a:effectLst>
+                  <a:outerShdw blurRad="38100" dist="38100" dir="2700000" algn="tl">
+                    <a:srgbClr val="000000">
+                      <a:alpha val="43137"/>
+                    </a:srgbClr>
+                  </a:outerShdw>
+                </a:effectLst>
+                <a:latin typeface="+mn-lt"/>
+                <a:ea typeface="+mn-ea"/>
+                <a:cs typeface="+mn-cs"/>
+              </a:defRPr>
+            </a:lvl3pPr>
+            <a:lvl4pPr marL="1187450" indent="-228600" algn="l" rtl="0" eaLnBrk="0" fontAlgn="base" hangingPunct="0">
+              <a:spcBef>
+                <a:spcPct val="20000"/>
+              </a:spcBef>
+              <a:spcAft>
+                <a:spcPct val="0"/>
+              </a:spcAft>
+              <a:buClr>
+                <a:srgbClr val="F8BD52"/>
+              </a:buClr>
+              <a:buFont typeface="Wingdings 2" pitchFamily="18" charset="2"/>
+              <a:buChar char=""/>
+              <a:defRPr sz="2600" b="1" kern="1200">
+                <a:solidFill>
+                  <a:schemeClr val="tx1">
+                    <a:lumMod val="20000"/>
+                    <a:lumOff val="80000"/>
+                  </a:schemeClr>
+                </a:solidFill>
+                <a:effectLst>
+                  <a:outerShdw blurRad="38100" dist="38100" dir="2700000" algn="tl">
+                    <a:srgbClr val="000000">
+                      <a:alpha val="43137"/>
+                    </a:srgbClr>
+                  </a:outerShdw>
+                </a:effectLst>
+                <a:latin typeface="+mn-lt"/>
+                <a:ea typeface="+mn-ea"/>
+                <a:cs typeface="+mn-cs"/>
+              </a:defRPr>
+            </a:lvl4pPr>
+            <a:lvl5pPr marL="1425575" indent="-228600" algn="l" rtl="0" eaLnBrk="0" fontAlgn="base" hangingPunct="0">
+              <a:spcBef>
+                <a:spcPct val="20000"/>
+              </a:spcBef>
+              <a:spcAft>
+                <a:spcPct val="0"/>
+              </a:spcAft>
+              <a:buClr>
+                <a:srgbClr val="46A6BD"/>
+              </a:buClr>
+              <a:buFont typeface="Wingdings 2" pitchFamily="18" charset="2"/>
+              <a:buChar char=""/>
+              <a:defRPr sz="2400" b="1" kern="1200">
+                <a:solidFill>
+                  <a:schemeClr val="tx1">
+                    <a:lumMod val="20000"/>
+                    <a:lumOff val="80000"/>
+                  </a:schemeClr>
+                </a:solidFill>
+                <a:effectLst>
+                  <a:outerShdw blurRad="38100" dist="38100" dir="2700000" algn="tl">
+                    <a:srgbClr val="000000">
+                      <a:alpha val="43137"/>
+                    </a:srgbClr>
+                  </a:outerShdw>
+                </a:effectLst>
+                <a:latin typeface="+mn-lt"/>
+                <a:ea typeface="+mn-ea"/>
+                <a:cs typeface="+mn-cs"/>
+              </a:defRPr>
+            </a:lvl5pPr>
+            <a:lvl6pPr marL="1673352" indent="-228600" algn="l" rtl="0" eaLnBrk="1" latinLnBrk="0" hangingPunct="1">
+              <a:spcBef>
+                <a:spcPct val="20000"/>
+              </a:spcBef>
+              <a:buClr>
+                <a:schemeClr val="accent6"/>
+              </a:buClr>
+              <a:buFont typeface="Wingdings 2"/>
+              <a:buChar char=""/>
+              <a:defRPr sz="1800" kern="1200">
+                <a:solidFill>
+                  <a:schemeClr val="tx1"/>
+                </a:solidFill>
+                <a:latin typeface="+mn-lt"/>
+                <a:ea typeface="+mn-ea"/>
+                <a:cs typeface="+mn-cs"/>
+              </a:defRPr>
+            </a:lvl6pPr>
+            <a:lvl7pPr marL="1911096" indent="-228600" algn="l" rtl="0" eaLnBrk="1" latinLnBrk="0" hangingPunct="1">
+              <a:spcBef>
+                <a:spcPct val="20000"/>
+              </a:spcBef>
+              <a:buClr>
+                <a:schemeClr val="tx2"/>
+              </a:buClr>
+              <a:buFont typeface="Wingdings 2"/>
+              <a:buChar char=""/>
+              <a:defRPr sz="1600" kern="1200">
+                <a:solidFill>
+                  <a:schemeClr val="tx1"/>
+                </a:solidFill>
+                <a:latin typeface="+mn-lt"/>
+                <a:ea typeface="+mn-ea"/>
+                <a:cs typeface="+mn-cs"/>
+              </a:defRPr>
+            </a:lvl7pPr>
+            <a:lvl8pPr marL="2121408" indent="-182880" algn="l" rtl="0" eaLnBrk="1" latinLnBrk="0" hangingPunct="1">
+              <a:spcBef>
+                <a:spcPct val="20000"/>
+              </a:spcBef>
+              <a:buClr>
+                <a:schemeClr val="tx2"/>
+              </a:buClr>
+              <a:buFont typeface="Wingdings 2"/>
+              <a:buChar char=""/>
+              <a:defRPr sz="1400" kern="1200">
+                <a:solidFill>
+                  <a:schemeClr val="tx1"/>
+                </a:solidFill>
+                <a:latin typeface="+mn-lt"/>
+                <a:ea typeface="+mn-ea"/>
+                <a:cs typeface="+mn-cs"/>
+              </a:defRPr>
+            </a:lvl8pPr>
+            <a:lvl9pPr marL="2322576" indent="-182880" algn="l" rtl="0" eaLnBrk="1" latinLnBrk="0" hangingPunct="1">
+              <a:spcBef>
+                <a:spcPct val="20000"/>
+              </a:spcBef>
+              <a:buClr>
+                <a:schemeClr val="tx2"/>
+              </a:buClr>
+              <a:buFont typeface="Wingdings 2"/>
+              <a:buChar char=""/>
+              <a:defRPr sz="1400" kern="1200">
+                <a:solidFill>
+                  <a:schemeClr val="tx1"/>
+                </a:solidFill>
+                <a:latin typeface="+mn-lt"/>
+                <a:ea typeface="+mn-ea"/>
+                <a:cs typeface="+mn-cs"/>
+              </a:defRPr>
+            </a:lvl9pPr>
+          </a:lstStyle>
+          <a:p>
+            <a:r>
+              <a:rPr lang="en-US" dirty="0" smtClean="0"/>
+              <a:t>Learning &amp; Development Team</a:t>
+            </a:r>
+            <a:endParaRPr lang="en-US" dirty="0"/>
+          </a:p>
+        </p:txBody>
+      </p:sp>
+      <p:sp>
+        <p:nvSpPr>
+          <p:cNvPr id="16" name="Text Placeholder 7"/>
+          <p:cNvSpPr>
+            <a:spLocks noGrp="1"/>
+          </p:cNvSpPr>
+          <p:nvPr/>
+        </p:nvSpPr>
+        <p:spPr>
+          <a:xfrm>
+            <a:off x="202286" y="5887937"/>
+            <a:ext cx="3990513" cy="369332"/>
+          </a:xfrm>
+          <a:prstGeom prst="rect">
+            <a:avLst/>
+          </a:prstGeom>
+          <a:noFill/>
+        </p:spPr>
+        <p:txBody>
+          <a:bodyPr wrap="square" rtlCol="0">
+            <a:spAutoFit/>
+          </a:bodyPr>
+          <a:lstStyle>
+            <a:lvl1pPr marL="319088" indent="-319088" algn="l" rtl="0" eaLnBrk="0" fontAlgn="base" hangingPunct="0">
+              <a:spcBef>
+                <a:spcPct val="20000"/>
+              </a:spcBef>
+              <a:spcAft>
+                <a:spcPct val="0"/>
+              </a:spcAft>
+              <a:buClr>
+                <a:schemeClr val="accent5">
+                  <a:lumMod val="40000"/>
+                  <a:lumOff val="60000"/>
+                </a:schemeClr>
+              </a:buClr>
+              <a:buSzPct val="70000"/>
+              <a:buFont typeface="Wingdings 2" pitchFamily="18" charset="2"/>
+              <a:buNone/>
+              <a:defRPr lang="en-US" sz="1800" b="1" kern="1200" dirty="0">
+                <a:solidFill>
+                  <a:schemeClr val="tx2">
+                    <a:lumMod val="20000"/>
+                    <a:lumOff val="80000"/>
+                  </a:schemeClr>
+                </a:solidFill>
+                <a:effectLst>
+                  <a:outerShdw blurRad="38100" dist="38100" dir="2700000" algn="tl">
+                    <a:srgbClr val="000000">
+                      <a:alpha val="43137"/>
+                    </a:srgbClr>
+                  </a:outerShdw>
+                </a:effectLst>
+                <a:latin typeface="Corbel" pitchFamily="34" charset="0"/>
+                <a:ea typeface="+mn-ea"/>
+                <a:cs typeface="+mn-cs"/>
+              </a:defRPr>
+            </a:lvl1pPr>
+            <a:lvl2pPr marL="630238" indent="-273050" algn="l" rtl="0" eaLnBrk="0" fontAlgn="base" hangingPunct="0">
+              <a:spcBef>
+                <a:spcPct val="20000"/>
+              </a:spcBef>
+              <a:spcAft>
+                <a:spcPct val="0"/>
+              </a:spcAft>
+              <a:buClr>
+                <a:schemeClr val="accent2">
+                  <a:lumMod val="60000"/>
+                  <a:lumOff val="40000"/>
+                </a:schemeClr>
+              </a:buClr>
+              <a:buFont typeface="Wingdings 2" pitchFamily="18" charset="2"/>
+              <a:buChar char=""/>
+              <a:defRPr sz="3000" b="1" kern="1200">
+                <a:solidFill>
+                  <a:schemeClr val="tx1">
+                    <a:lumMod val="20000"/>
+                    <a:lumOff val="80000"/>
+                  </a:schemeClr>
+                </a:solidFill>
+                <a:effectLst>
+                  <a:outerShdw blurRad="38100" dist="38100" dir="2700000" algn="tl">
+                    <a:srgbClr val="000000">
+                      <a:alpha val="43137"/>
+                    </a:srgbClr>
+                  </a:outerShdw>
+                </a:effectLst>
+                <a:latin typeface="+mn-lt"/>
+                <a:ea typeface="+mn-ea"/>
+                <a:cs typeface="+mn-cs"/>
+              </a:defRPr>
+            </a:lvl2pPr>
+            <a:lvl3pPr marL="922338" indent="-273050" algn="l" rtl="0" eaLnBrk="0" fontAlgn="base" hangingPunct="0">
+              <a:spcBef>
+                <a:spcPct val="20000"/>
+              </a:spcBef>
+              <a:spcAft>
+                <a:spcPct val="0"/>
+              </a:spcAft>
+              <a:buClr>
+                <a:schemeClr val="tx1">
+                  <a:lumMod val="50000"/>
+                </a:schemeClr>
+              </a:buClr>
+              <a:buFont typeface="Wingdings 2" pitchFamily="18" charset="2"/>
+              <a:buChar char=""/>
+              <a:defRPr sz="2800" b="1" kern="1200">
+                <a:solidFill>
+                  <a:schemeClr val="tx1">
+                    <a:lumMod val="20000"/>
+                    <a:lumOff val="80000"/>
+                  </a:schemeClr>
+                </a:solidFill>
+                <a:effectLst>
+                  <a:outerShdw blurRad="38100" dist="38100" dir="2700000" algn="tl">
+                    <a:srgbClr val="000000">
+                      <a:alpha val="43137"/>
+                    </a:srgbClr>
+                  </a:outerShdw>
+                </a:effectLst>
+                <a:latin typeface="+mn-lt"/>
+                <a:ea typeface="+mn-ea"/>
+                <a:cs typeface="+mn-cs"/>
+              </a:defRPr>
+            </a:lvl3pPr>
+            <a:lvl4pPr marL="1187450" indent="-228600" algn="l" rtl="0" eaLnBrk="0" fontAlgn="base" hangingPunct="0">
+              <a:spcBef>
+                <a:spcPct val="20000"/>
+              </a:spcBef>
+              <a:spcAft>
+                <a:spcPct val="0"/>
+              </a:spcAft>
+              <a:buClr>
+                <a:srgbClr val="F8BD52"/>
+              </a:buClr>
+              <a:buFont typeface="Wingdings 2" pitchFamily="18" charset="2"/>
+              <a:buChar char=""/>
+              <a:defRPr sz="2600" b="1" kern="1200">
+                <a:solidFill>
+                  <a:schemeClr val="tx1">
+                    <a:lumMod val="20000"/>
+                    <a:lumOff val="80000"/>
+                  </a:schemeClr>
+                </a:solidFill>
+                <a:effectLst>
+                  <a:outerShdw blurRad="38100" dist="38100" dir="2700000" algn="tl">
+                    <a:srgbClr val="000000">
+                      <a:alpha val="43137"/>
+                    </a:srgbClr>
+                  </a:outerShdw>
+                </a:effectLst>
+                <a:latin typeface="+mn-lt"/>
+                <a:ea typeface="+mn-ea"/>
+                <a:cs typeface="+mn-cs"/>
+              </a:defRPr>
+            </a:lvl4pPr>
+            <a:lvl5pPr marL="1425575" indent="-228600" algn="l" rtl="0" eaLnBrk="0" fontAlgn="base" hangingPunct="0">
+              <a:spcBef>
+                <a:spcPct val="20000"/>
+              </a:spcBef>
+              <a:spcAft>
+                <a:spcPct val="0"/>
+              </a:spcAft>
+              <a:buClr>
+                <a:srgbClr val="46A6BD"/>
+              </a:buClr>
+              <a:buFont typeface="Wingdings 2" pitchFamily="18" charset="2"/>
+              <a:buChar char=""/>
+              <a:defRPr sz="2400" b="1" kern="1200">
+                <a:solidFill>
+                  <a:schemeClr val="tx1">
+                    <a:lumMod val="20000"/>
+                    <a:lumOff val="80000"/>
+                  </a:schemeClr>
+                </a:solidFill>
+                <a:effectLst>
+                  <a:outerShdw blurRad="38100" dist="38100" dir="2700000" algn="tl">
+                    <a:srgbClr val="000000">
+                      <a:alpha val="43137"/>
+                    </a:srgbClr>
+                  </a:outerShdw>
+                </a:effectLst>
+                <a:latin typeface="+mn-lt"/>
+                <a:ea typeface="+mn-ea"/>
+                <a:cs typeface="+mn-cs"/>
+              </a:defRPr>
+            </a:lvl5pPr>
+            <a:lvl6pPr marL="1673352" indent="-228600" algn="l" rtl="0" eaLnBrk="1" latinLnBrk="0" hangingPunct="1">
+              <a:spcBef>
+                <a:spcPct val="20000"/>
+              </a:spcBef>
+              <a:buClr>
+                <a:schemeClr val="accent6"/>
+              </a:buClr>
+              <a:buFont typeface="Wingdings 2"/>
+              <a:buChar char=""/>
+              <a:defRPr sz="1800" kern="1200">
+                <a:solidFill>
+                  <a:schemeClr val="tx1"/>
+                </a:solidFill>
+                <a:latin typeface="+mn-lt"/>
+                <a:ea typeface="+mn-ea"/>
+                <a:cs typeface="+mn-cs"/>
+              </a:defRPr>
+            </a:lvl6pPr>
+            <a:lvl7pPr marL="1911096" indent="-228600" algn="l" rtl="0" eaLnBrk="1" latinLnBrk="0" hangingPunct="1">
+              <a:spcBef>
+                <a:spcPct val="20000"/>
+              </a:spcBef>
+              <a:buClr>
+                <a:schemeClr val="tx2"/>
+              </a:buClr>
+              <a:buFont typeface="Wingdings 2"/>
+              <a:buChar char=""/>
+              <a:defRPr sz="1600" kern="1200">
+                <a:solidFill>
+                  <a:schemeClr val="tx1"/>
+                </a:solidFill>
+                <a:latin typeface="+mn-lt"/>
+                <a:ea typeface="+mn-ea"/>
+                <a:cs typeface="+mn-cs"/>
+              </a:defRPr>
+            </a:lvl7pPr>
+            <a:lvl8pPr marL="2121408" indent="-182880" algn="l" rtl="0" eaLnBrk="1" latinLnBrk="0" hangingPunct="1">
+              <a:spcBef>
+                <a:spcPct val="20000"/>
+              </a:spcBef>
+              <a:buClr>
+                <a:schemeClr val="tx2"/>
+              </a:buClr>
+              <a:buFont typeface="Wingdings 2"/>
+              <a:buChar char=""/>
+              <a:defRPr sz="1400" kern="1200">
+                <a:solidFill>
+                  <a:schemeClr val="tx1"/>
+                </a:solidFill>
+                <a:latin typeface="+mn-lt"/>
+                <a:ea typeface="+mn-ea"/>
+                <a:cs typeface="+mn-cs"/>
+              </a:defRPr>
+            </a:lvl8pPr>
+            <a:lvl9pPr marL="2322576" indent="-182880" algn="l" rtl="0" eaLnBrk="1" latinLnBrk="0" hangingPunct="1">
+              <a:spcBef>
+                <a:spcPct val="20000"/>
+              </a:spcBef>
+              <a:buClr>
+                <a:schemeClr val="tx2"/>
+              </a:buClr>
+              <a:buFont typeface="Wingdings 2"/>
+              <a:buChar char=""/>
+              <a:defRPr sz="1400" kern="1200">
+                <a:solidFill>
+                  <a:schemeClr val="tx1"/>
+                </a:solidFill>
+                <a:latin typeface="+mn-lt"/>
+                <a:ea typeface="+mn-ea"/>
+                <a:cs typeface="+mn-cs"/>
+              </a:defRPr>
+            </a:lvl9pPr>
+          </a:lstStyle>
+          <a:p>
+            <a:r>
+              <a:rPr lang="en-US" dirty="0" smtClean="0">
+                <a:hlinkClick r:id="rId8"/>
+              </a:rPr>
+              <a:t>http://academy.telerik.com</a:t>
+            </a:r>
+            <a:r>
+              <a:rPr lang="en-US" dirty="0" smtClean="0"/>
+              <a:t> </a:t>
+            </a:r>
+            <a:endParaRPr lang="en-US" dirty="0"/>
+          </a:p>
+        </p:txBody>
+      </p:sp>
+      <p:sp>
+        <p:nvSpPr>
+          <p:cNvPr id="17" name="Text Placeholder 13"/>
+          <p:cNvSpPr>
+            <a:spLocks noGrp="1"/>
+          </p:cNvSpPr>
+          <p:nvPr/>
+        </p:nvSpPr>
+        <p:spPr>
+          <a:xfrm>
+            <a:off x="202286" y="5208494"/>
+            <a:ext cx="3990513" cy="461665"/>
+          </a:xfrm>
+          <a:prstGeom prst="rect">
+            <a:avLst/>
+          </a:prstGeom>
+          <a:noFill/>
+        </p:spPr>
+        <p:txBody>
+          <a:bodyPr wrap="square" rtlCol="0">
+            <a:spAutoFit/>
+          </a:bodyPr>
+          <a:lstStyle>
+            <a:lvl1pPr marL="0" indent="0" algn="l" rtl="0" eaLnBrk="0" fontAlgn="base" hangingPunct="0">
+              <a:spcBef>
+                <a:spcPct val="20000"/>
+              </a:spcBef>
+              <a:spcAft>
+                <a:spcPct val="0"/>
+              </a:spcAft>
+              <a:buClr>
+                <a:schemeClr val="accent5">
+                  <a:lumMod val="40000"/>
+                  <a:lumOff val="60000"/>
+                </a:schemeClr>
+              </a:buClr>
+              <a:buSzPct val="70000"/>
+              <a:buFont typeface="Wingdings 2" pitchFamily="18" charset="2"/>
+              <a:buNone/>
+              <a:defRPr lang="en-US" sz="2400" b="1" kern="1200" dirty="0">
+                <a:solidFill>
+                  <a:schemeClr val="tx2">
+                    <a:lumMod val="50000"/>
+                  </a:schemeClr>
+                </a:solidFill>
+                <a:effectLst>
+                  <a:outerShdw blurRad="38100" dist="38100" dir="2700000" algn="tl">
+                    <a:srgbClr val="000000">
+                      <a:alpha val="43137"/>
+                    </a:srgbClr>
+                  </a:outerShdw>
+                </a:effectLst>
+                <a:latin typeface="Corbel" pitchFamily="34" charset="0"/>
+                <a:ea typeface="+mn-ea"/>
+                <a:cs typeface="+mn-cs"/>
+              </a:defRPr>
+            </a:lvl1pPr>
+            <a:lvl2pPr marL="630238" indent="-273050" algn="l" rtl="0" eaLnBrk="0" fontAlgn="base" hangingPunct="0">
+              <a:spcBef>
+                <a:spcPct val="20000"/>
+              </a:spcBef>
+              <a:spcAft>
+                <a:spcPct val="0"/>
+              </a:spcAft>
+              <a:buClr>
+                <a:schemeClr val="accent2">
+                  <a:lumMod val="60000"/>
+                  <a:lumOff val="40000"/>
+                </a:schemeClr>
+              </a:buClr>
+              <a:buFont typeface="Wingdings 2" pitchFamily="18" charset="2"/>
+              <a:buChar char=""/>
+              <a:defRPr sz="3000" b="1" kern="1200">
+                <a:solidFill>
+                  <a:schemeClr val="tx1">
+                    <a:lumMod val="20000"/>
+                    <a:lumOff val="80000"/>
+                  </a:schemeClr>
+                </a:solidFill>
+                <a:effectLst>
+                  <a:outerShdw blurRad="38100" dist="38100" dir="2700000" algn="tl">
+                    <a:srgbClr val="000000">
+                      <a:alpha val="43137"/>
+                    </a:srgbClr>
+                  </a:outerShdw>
+                </a:effectLst>
+                <a:latin typeface="+mn-lt"/>
+                <a:ea typeface="+mn-ea"/>
+                <a:cs typeface="+mn-cs"/>
+              </a:defRPr>
+            </a:lvl2pPr>
+            <a:lvl3pPr marL="922338" indent="-273050" algn="l" rtl="0" eaLnBrk="0" fontAlgn="base" hangingPunct="0">
+              <a:spcBef>
+                <a:spcPct val="20000"/>
+              </a:spcBef>
+              <a:spcAft>
+                <a:spcPct val="0"/>
+              </a:spcAft>
+              <a:buClr>
+                <a:schemeClr val="tx1">
+                  <a:lumMod val="50000"/>
+                </a:schemeClr>
+              </a:buClr>
+              <a:buFont typeface="Wingdings 2" pitchFamily="18" charset="2"/>
+              <a:buChar char=""/>
+              <a:defRPr sz="2800" b="1" kern="1200">
+                <a:solidFill>
+                  <a:schemeClr val="tx1">
+                    <a:lumMod val="20000"/>
+                    <a:lumOff val="80000"/>
+                  </a:schemeClr>
+                </a:solidFill>
+                <a:effectLst>
+                  <a:outerShdw blurRad="38100" dist="38100" dir="2700000" algn="tl">
+                    <a:srgbClr val="000000">
+                      <a:alpha val="43137"/>
+                    </a:srgbClr>
+                  </a:outerShdw>
+                </a:effectLst>
+                <a:latin typeface="+mn-lt"/>
+                <a:ea typeface="+mn-ea"/>
+                <a:cs typeface="+mn-cs"/>
+              </a:defRPr>
+            </a:lvl3pPr>
+            <a:lvl4pPr marL="1187450" indent="-228600" algn="l" rtl="0" eaLnBrk="0" fontAlgn="base" hangingPunct="0">
+              <a:spcBef>
+                <a:spcPct val="20000"/>
+              </a:spcBef>
+              <a:spcAft>
+                <a:spcPct val="0"/>
+              </a:spcAft>
+              <a:buClr>
+                <a:srgbClr val="F8BD52"/>
+              </a:buClr>
+              <a:buFont typeface="Wingdings 2" pitchFamily="18" charset="2"/>
+              <a:buChar char=""/>
+              <a:defRPr sz="2600" b="1" kern="1200">
+                <a:solidFill>
+                  <a:schemeClr val="tx1">
+                    <a:lumMod val="20000"/>
+                    <a:lumOff val="80000"/>
+                  </a:schemeClr>
+                </a:solidFill>
+                <a:effectLst>
+                  <a:outerShdw blurRad="38100" dist="38100" dir="2700000" algn="tl">
+                    <a:srgbClr val="000000">
+                      <a:alpha val="43137"/>
+                    </a:srgbClr>
+                  </a:outerShdw>
+                </a:effectLst>
+                <a:latin typeface="+mn-lt"/>
+                <a:ea typeface="+mn-ea"/>
+                <a:cs typeface="+mn-cs"/>
+              </a:defRPr>
+            </a:lvl4pPr>
+            <a:lvl5pPr marL="1425575" indent="-228600" algn="l" rtl="0" eaLnBrk="0" fontAlgn="base" hangingPunct="0">
+              <a:spcBef>
+                <a:spcPct val="20000"/>
+              </a:spcBef>
+              <a:spcAft>
+                <a:spcPct val="0"/>
+              </a:spcAft>
+              <a:buClr>
+                <a:srgbClr val="46A6BD"/>
+              </a:buClr>
+              <a:buFont typeface="Wingdings 2" pitchFamily="18" charset="2"/>
+              <a:buChar char=""/>
+              <a:defRPr sz="2400" b="1" kern="1200">
+                <a:solidFill>
+                  <a:schemeClr val="tx1">
+                    <a:lumMod val="20000"/>
+                    <a:lumOff val="80000"/>
+                  </a:schemeClr>
+                </a:solidFill>
+                <a:effectLst>
+                  <a:outerShdw blurRad="38100" dist="38100" dir="2700000" algn="tl">
+                    <a:srgbClr val="000000">
+                      <a:alpha val="43137"/>
+                    </a:srgbClr>
+                  </a:outerShdw>
+                </a:effectLst>
+                <a:latin typeface="+mn-lt"/>
+                <a:ea typeface="+mn-ea"/>
+                <a:cs typeface="+mn-cs"/>
+              </a:defRPr>
+            </a:lvl5pPr>
+            <a:lvl6pPr marL="1673352" indent="-228600" algn="l" rtl="0" eaLnBrk="1" latinLnBrk="0" hangingPunct="1">
+              <a:spcBef>
+                <a:spcPct val="20000"/>
+              </a:spcBef>
+              <a:buClr>
+                <a:schemeClr val="accent6"/>
+              </a:buClr>
+              <a:buFont typeface="Wingdings 2"/>
+              <a:buChar char=""/>
+              <a:defRPr sz="1800" kern="1200">
+                <a:solidFill>
+                  <a:schemeClr val="tx1"/>
+                </a:solidFill>
+                <a:latin typeface="+mn-lt"/>
+                <a:ea typeface="+mn-ea"/>
+                <a:cs typeface="+mn-cs"/>
+              </a:defRPr>
+            </a:lvl6pPr>
+            <a:lvl7pPr marL="1911096" indent="-228600" algn="l" rtl="0" eaLnBrk="1" latinLnBrk="0" hangingPunct="1">
+              <a:spcBef>
+                <a:spcPct val="20000"/>
+              </a:spcBef>
+              <a:buClr>
+                <a:schemeClr val="tx2"/>
+              </a:buClr>
+              <a:buFont typeface="Wingdings 2"/>
+              <a:buChar char=""/>
+              <a:defRPr sz="1600" kern="1200">
+                <a:solidFill>
+                  <a:schemeClr val="tx1"/>
+                </a:solidFill>
+                <a:latin typeface="+mn-lt"/>
+                <a:ea typeface="+mn-ea"/>
+                <a:cs typeface="+mn-cs"/>
+              </a:defRPr>
+            </a:lvl7pPr>
+            <a:lvl8pPr marL="2121408" indent="-182880" algn="l" rtl="0" eaLnBrk="1" latinLnBrk="0" hangingPunct="1">
+              <a:spcBef>
+                <a:spcPct val="20000"/>
+              </a:spcBef>
+              <a:buClr>
+                <a:schemeClr val="tx2"/>
+              </a:buClr>
+              <a:buFont typeface="Wingdings 2"/>
+              <a:buChar char=""/>
+              <a:defRPr sz="1400" kern="1200">
+                <a:solidFill>
+                  <a:schemeClr val="tx1"/>
+                </a:solidFill>
+                <a:latin typeface="+mn-lt"/>
+                <a:ea typeface="+mn-ea"/>
+                <a:cs typeface="+mn-cs"/>
+              </a:defRPr>
+            </a:lvl8pPr>
+            <a:lvl9pPr marL="2322576" indent="-182880" algn="l" rtl="0" eaLnBrk="1" latinLnBrk="0" hangingPunct="1">
+              <a:spcBef>
+                <a:spcPct val="20000"/>
+              </a:spcBef>
+              <a:buClr>
+                <a:schemeClr val="tx2"/>
+              </a:buClr>
+              <a:buFont typeface="Wingdings 2"/>
+              <a:buChar char=""/>
+              <a:defRPr sz="1400" kern="1200">
+                <a:solidFill>
+                  <a:schemeClr val="tx1"/>
+                </a:solidFill>
+                <a:latin typeface="+mn-lt"/>
+                <a:ea typeface="+mn-ea"/>
+                <a:cs typeface="+mn-cs"/>
+              </a:defRPr>
+            </a:lvl9pPr>
+          </a:lstStyle>
+          <a:p>
+            <a:r>
+              <a:rPr lang="en-US" dirty="0" smtClean="0"/>
+              <a:t>Telerik Software Academy</a:t>
+            </a:r>
+            <a:endParaRPr lang="en-US" dirty="0"/>
+          </a:p>
+        </p:txBody>
+      </p:sp>
     </p:spTree>
     <p:extLst>
       <p:ext uri="{BB962C8B-B14F-4D97-AF65-F5344CB8AC3E}">

</xml_diff>